<commit_message>
Minor fix to Datapath
</commit_message>
<xml_diff>
--- a/EC_FINAL_PROJECT/EC_FINAL_PROJECT/verilog/fitness_evaluation/image/evaluate_fit_DP.pptx
+++ b/EC_FINAL_PROJECT/EC_FINAL_PROJECT/verilog/fitness_evaluation/image/evaluate_fit_DP.pptx
@@ -104,6 +104,11 @@
       </a:defRPr>
     </a:lvl9pPr>
   </p:defaultTextStyle>
+  <p:extLst>
+    <p:ext uri="{EFAFB233-063F-42B5-8137-9DF3F51BA10A}">
+      <p15:sldGuideLst xmlns:p15="http://schemas.microsoft.com/office/powerpoint/2012/main"/>
+    </p:ext>
+  </p:extLst>
 </p:presentation>
 </file>
 
@@ -5112,7 +5117,7 @@
                 <a:latin typeface="Times New Roman" panose="02020603050405020304" pitchFamily="18" charset="0"/>
                 <a:cs typeface="Times New Roman" panose="02020603050405020304" pitchFamily="18" charset="0"/>
               </a:rPr>
-              <a:t>11x4</a:t>
+              <a:t>3x4</a:t>
             </a:r>
             <a:endParaRPr lang="zh-TW" altLang="en-US" sz="1200" dirty="0">
               <a:latin typeface="Times New Roman" panose="02020603050405020304" pitchFamily="18" charset="0"/>
@@ -5136,7 +5141,7 @@
         <p:spPr>
           <a:xfrm>
             <a:off x="-37956" y="5351271"/>
-            <a:ext cx="533400" cy="276999"/>
+            <a:ext cx="725366" cy="276999"/>
           </a:xfrm>
           <a:prstGeom prst="rect">
             <a:avLst/>
@@ -5154,7 +5159,7 @@
                 <a:latin typeface="Times New Roman" panose="02020603050405020304" pitchFamily="18" charset="0"/>
                 <a:cs typeface="Times New Roman" panose="02020603050405020304" pitchFamily="18" charset="0"/>
               </a:rPr>
-              <a:t>11x4</a:t>
+              <a:t>3*3*4</a:t>
             </a:r>
             <a:endParaRPr lang="zh-TW" altLang="en-US" sz="1200" dirty="0">
               <a:latin typeface="Times New Roman" panose="02020603050405020304" pitchFamily="18" charset="0"/>
@@ -5666,7 +5671,7 @@
         </p:nvSpPr>
         <p:spPr>
           <a:xfrm>
-            <a:off x="2555179" y="252012"/>
+            <a:off x="2154971" y="79647"/>
             <a:ext cx="1228154" cy="923330"/>
           </a:xfrm>
           <a:prstGeom prst="rect">
@@ -9475,7 +9480,7 @@
         </p:nvSpPr>
         <p:spPr>
           <a:xfrm>
-            <a:off x="4451641" y="-13140"/>
+            <a:off x="4241505" y="-114498"/>
             <a:ext cx="2373426" cy="923330"/>
           </a:xfrm>
           <a:prstGeom prst="rect">
@@ -9527,7 +9532,7 @@
         </p:nvSpPr>
         <p:spPr>
           <a:xfrm>
-            <a:off x="7538719" y="17256"/>
+            <a:off x="7518643" y="-130565"/>
             <a:ext cx="2373426" cy="923330"/>
           </a:xfrm>
           <a:prstGeom prst="rect">
@@ -11547,6 +11552,132 @@
                 <a:cs typeface="Times New Roman" panose="02020603050405020304" pitchFamily="18" charset="0"/>
               </a:rPr>
               <a:t>WR_interact_matrix_i</a:t>
+            </a:r>
+            <a:endParaRPr lang="zh-TW" altLang="en-US" sz="1200" dirty="0">
+              <a:latin typeface="Times New Roman" panose="02020603050405020304" pitchFamily="18" charset="0"/>
+              <a:cs typeface="Times New Roman" panose="02020603050405020304" pitchFamily="18" charset="0"/>
+            </a:endParaRPr>
+          </a:p>
+        </p:txBody>
+      </p:sp>
+      <p:sp>
+        <p:nvSpPr>
+          <p:cNvPr id="213" name="文字方塊 212">
+            <a:extLst>
+              <a:ext uri="{FF2B5EF4-FFF2-40B4-BE49-F238E27FC236}">
+                <a16:creationId xmlns:a16="http://schemas.microsoft.com/office/drawing/2014/main" id="{095BAE17-F939-4C0B-87EE-CF68C9274DA6}"/>
+              </a:ext>
+            </a:extLst>
+          </p:cNvPr>
+          <p:cNvSpPr txBox="1"/>
+          <p:nvPr/>
+        </p:nvSpPr>
+        <p:spPr>
+          <a:xfrm>
+            <a:off x="4725148" y="550178"/>
+            <a:ext cx="382312" cy="276999"/>
+          </a:xfrm>
+          <a:prstGeom prst="rect">
+            <a:avLst/>
+          </a:prstGeom>
+          <a:noFill/>
+        </p:spPr>
+        <p:txBody>
+          <a:bodyPr wrap="square" rtlCol="0">
+            <a:spAutoFit/>
+          </a:bodyPr>
+          <a:lstStyle/>
+          <a:p>
+            <a:r>
+              <a:rPr lang="en-US" altLang="zh-TW" sz="1200" dirty="0">
+                <a:latin typeface="Times New Roman" panose="02020603050405020304" pitchFamily="18" charset="0"/>
+                <a:cs typeface="Times New Roman" panose="02020603050405020304" pitchFamily="18" charset="0"/>
+              </a:rPr>
+              <a:t>lv1</a:t>
+            </a:r>
+            <a:endParaRPr lang="zh-TW" altLang="en-US" sz="1200" dirty="0">
+              <a:latin typeface="Times New Roman" panose="02020603050405020304" pitchFamily="18" charset="0"/>
+              <a:cs typeface="Times New Roman" panose="02020603050405020304" pitchFamily="18" charset="0"/>
+            </a:endParaRPr>
+          </a:p>
+        </p:txBody>
+      </p:sp>
+      <p:sp>
+        <p:nvSpPr>
+          <p:cNvPr id="214" name="文字方塊 213">
+            <a:extLst>
+              <a:ext uri="{FF2B5EF4-FFF2-40B4-BE49-F238E27FC236}">
+                <a16:creationId xmlns:a16="http://schemas.microsoft.com/office/drawing/2014/main" id="{E5B8BEFE-7933-4C2F-93CB-A66266D778C7}"/>
+              </a:ext>
+            </a:extLst>
+          </p:cNvPr>
+          <p:cNvSpPr txBox="1"/>
+          <p:nvPr/>
+        </p:nvSpPr>
+        <p:spPr>
+          <a:xfrm>
+            <a:off x="5391094" y="566191"/>
+            <a:ext cx="382312" cy="276999"/>
+          </a:xfrm>
+          <a:prstGeom prst="rect">
+            <a:avLst/>
+          </a:prstGeom>
+          <a:noFill/>
+        </p:spPr>
+        <p:txBody>
+          <a:bodyPr wrap="square" rtlCol="0">
+            <a:spAutoFit/>
+          </a:bodyPr>
+          <a:lstStyle/>
+          <a:p>
+            <a:r>
+              <a:rPr lang="en-US" altLang="zh-TW" sz="1200" dirty="0">
+                <a:latin typeface="Times New Roman" panose="02020603050405020304" pitchFamily="18" charset="0"/>
+                <a:cs typeface="Times New Roman" panose="02020603050405020304" pitchFamily="18" charset="0"/>
+              </a:rPr>
+              <a:t>lv2</a:t>
+            </a:r>
+            <a:endParaRPr lang="zh-TW" altLang="en-US" sz="1200" dirty="0">
+              <a:latin typeface="Times New Roman" panose="02020603050405020304" pitchFamily="18" charset="0"/>
+              <a:cs typeface="Times New Roman" panose="02020603050405020304" pitchFamily="18" charset="0"/>
+            </a:endParaRPr>
+          </a:p>
+        </p:txBody>
+      </p:sp>
+      <p:sp>
+        <p:nvSpPr>
+          <p:cNvPr id="215" name="文字方塊 214">
+            <a:extLst>
+              <a:ext uri="{FF2B5EF4-FFF2-40B4-BE49-F238E27FC236}">
+                <a16:creationId xmlns:a16="http://schemas.microsoft.com/office/drawing/2014/main" id="{795E3D47-3413-4842-8CF3-C5302BB589EF}"/>
+              </a:ext>
+            </a:extLst>
+          </p:cNvPr>
+          <p:cNvSpPr txBox="1"/>
+          <p:nvPr/>
+        </p:nvSpPr>
+        <p:spPr>
+          <a:xfrm>
+            <a:off x="5993808" y="563643"/>
+            <a:ext cx="382312" cy="276999"/>
+          </a:xfrm>
+          <a:prstGeom prst="rect">
+            <a:avLst/>
+          </a:prstGeom>
+          <a:noFill/>
+        </p:spPr>
+        <p:txBody>
+          <a:bodyPr wrap="square" rtlCol="0">
+            <a:spAutoFit/>
+          </a:bodyPr>
+          <a:lstStyle/>
+          <a:p>
+            <a:r>
+              <a:rPr lang="en-US" altLang="zh-TW" sz="1200" dirty="0">
+                <a:latin typeface="Times New Roman" panose="02020603050405020304" pitchFamily="18" charset="0"/>
+                <a:cs typeface="Times New Roman" panose="02020603050405020304" pitchFamily="18" charset="0"/>
+              </a:rPr>
+              <a:t>lv3</a:t>
             </a:r>
             <a:endParaRPr lang="zh-TW" altLang="en-US" sz="1200" dirty="0">
               <a:latin typeface="Times New Roman" panose="02020603050405020304" pitchFamily="18" charset="0"/>

</xml_diff>

<commit_message>
Evaluate fitness DONE need TB to test
</commit_message>
<xml_diff>
--- a/EC_FINAL_PROJECT/EC_FINAL_PROJECT/verilog/fitness_evaluation/image/evaluate_fit_DP.pptx
+++ b/EC_FINAL_PROJECT/EC_FINAL_PROJECT/verilog/fitness_evaluation/image/evaluate_fit_DP.pptx
@@ -3533,8 +3533,8 @@
         </p:nvGrpSpPr>
         <p:grpSpPr>
           <a:xfrm>
-            <a:off x="3613994" y="822121"/>
-            <a:ext cx="601495" cy="1728134"/>
+            <a:off x="3613994" y="822120"/>
+            <a:ext cx="601495" cy="2026267"/>
             <a:chOff x="2383389" y="3557589"/>
             <a:chExt cx="258671" cy="443047"/>
           </a:xfrm>
@@ -7563,14 +7563,14 @@
           </p:cNvPr>
           <p:cNvCxnSpPr>
             <a:cxnSpLocks/>
-            <a:endCxn id="196" idx="3"/>
+            <a:endCxn id="235" idx="2"/>
           </p:cNvCxnSpPr>
           <p:nvPr/>
         </p:nvCxnSpPr>
         <p:spPr>
-          <a:xfrm flipV="1">
-            <a:off x="4220200" y="2528997"/>
-            <a:ext cx="1178043" cy="2955"/>
+          <a:xfrm>
+            <a:off x="4229843" y="2733236"/>
+            <a:ext cx="397001" cy="0"/>
           </a:xfrm>
           <a:prstGeom prst="straightConnector1">
             <a:avLst/>
@@ -8566,13 +8566,14 @@
           </p:cNvPr>
           <p:cNvCxnSpPr>
             <a:cxnSpLocks/>
+            <a:stCxn id="237" idx="6"/>
           </p:cNvCxnSpPr>
           <p:nvPr/>
         </p:nvCxnSpPr>
         <p:spPr>
           <a:xfrm flipV="1">
-            <a:off x="5107984" y="2632527"/>
-            <a:ext cx="988016" cy="1341678"/>
+            <a:off x="5793430" y="2676074"/>
+            <a:ext cx="357654" cy="1285754"/>
           </a:xfrm>
           <a:prstGeom prst="straightConnector1">
             <a:avLst/>
@@ -9139,14 +9140,15 @@
           </p:cNvPr>
           <p:cNvCxnSpPr>
             <a:cxnSpLocks/>
+            <a:stCxn id="239" idx="0"/>
             <a:endCxn id="268" idx="3"/>
           </p:cNvCxnSpPr>
           <p:nvPr/>
         </p:nvCxnSpPr>
         <p:spPr>
           <a:xfrm flipV="1">
-            <a:off x="7010688" y="2488335"/>
-            <a:ext cx="1105263" cy="2345582"/>
+            <a:off x="7567682" y="2488335"/>
+            <a:ext cx="548269" cy="492174"/>
           </a:xfrm>
           <a:prstGeom prst="straightConnector1">
             <a:avLst/>
@@ -12093,6 +12095,368 @@
                 <a:cs typeface="Times New Roman" panose="02020603050405020304" pitchFamily="18" charset="0"/>
               </a:rPr>
               <a:t>Ind_WB_idx_o</a:t>
+            </a:r>
+            <a:endParaRPr lang="zh-TW" altLang="en-US" sz="1200" dirty="0">
+              <a:latin typeface="Times New Roman" panose="02020603050405020304" pitchFamily="18" charset="0"/>
+              <a:cs typeface="Times New Roman" panose="02020603050405020304" pitchFamily="18" charset="0"/>
+            </a:endParaRPr>
+          </a:p>
+        </p:txBody>
+      </p:sp>
+      <p:sp>
+        <p:nvSpPr>
+          <p:cNvPr id="235" name="流程圖: 接點 234">
+            <a:extLst>
+              <a:ext uri="{FF2B5EF4-FFF2-40B4-BE49-F238E27FC236}">
+                <a16:creationId xmlns:a16="http://schemas.microsoft.com/office/drawing/2014/main" id="{6CD35FD4-C152-4175-94B7-58DA54A7E7E8}"/>
+              </a:ext>
+            </a:extLst>
+          </p:cNvPr>
+          <p:cNvSpPr/>
+          <p:nvPr/>
+        </p:nvSpPr>
+        <p:spPr>
+          <a:xfrm>
+            <a:off x="4626844" y="2556828"/>
+            <a:ext cx="512358" cy="352816"/>
+          </a:xfrm>
+          <a:prstGeom prst="flowChartConnector">
+            <a:avLst/>
+          </a:prstGeom>
+        </p:spPr>
+        <p:style>
+          <a:lnRef idx="2">
+            <a:schemeClr val="accent4">
+              <a:shade val="50000"/>
+            </a:schemeClr>
+          </a:lnRef>
+          <a:fillRef idx="1">
+            <a:schemeClr val="accent4"/>
+          </a:fillRef>
+          <a:effectRef idx="0">
+            <a:schemeClr val="accent4"/>
+          </a:effectRef>
+          <a:fontRef idx="minor">
+            <a:schemeClr val="lt1"/>
+          </a:fontRef>
+        </p:style>
+        <p:txBody>
+          <a:bodyPr rtlCol="0" anchor="ctr"/>
+          <a:lstStyle/>
+          <a:p>
+            <a:pPr algn="ctr"/>
+            <a:r>
+              <a:rPr lang="en-US" altLang="zh-TW" sz="1400" dirty="0"/>
+              <a:t>SE</a:t>
+            </a:r>
+            <a:endParaRPr lang="zh-TW" altLang="en-US" sz="1400" dirty="0"/>
+          </a:p>
+        </p:txBody>
+      </p:sp>
+      <p:cxnSp>
+        <p:nvCxnSpPr>
+          <p:cNvPr id="236" name="直線單箭頭接點 235">
+            <a:extLst>
+              <a:ext uri="{FF2B5EF4-FFF2-40B4-BE49-F238E27FC236}">
+                <a16:creationId xmlns:a16="http://schemas.microsoft.com/office/drawing/2014/main" id="{8ECBAF54-D030-4BD9-84ED-EBCC86AFF04E}"/>
+              </a:ext>
+            </a:extLst>
+          </p:cNvPr>
+          <p:cNvCxnSpPr>
+            <a:cxnSpLocks/>
+            <a:stCxn id="235" idx="6"/>
+            <a:endCxn id="196" idx="3"/>
+          </p:cNvCxnSpPr>
+          <p:nvPr/>
+        </p:nvCxnSpPr>
+        <p:spPr>
+          <a:xfrm flipV="1">
+            <a:off x="5139202" y="2528997"/>
+            <a:ext cx="259041" cy="204239"/>
+          </a:xfrm>
+          <a:prstGeom prst="straightConnector1">
+            <a:avLst/>
+          </a:prstGeom>
+          <a:ln>
+            <a:tailEnd type="triangle"/>
+          </a:ln>
+        </p:spPr>
+        <p:style>
+          <a:lnRef idx="3">
+            <a:schemeClr val="accent1"/>
+          </a:lnRef>
+          <a:fillRef idx="0">
+            <a:schemeClr val="accent1"/>
+          </a:fillRef>
+          <a:effectRef idx="2">
+            <a:schemeClr val="accent1"/>
+          </a:effectRef>
+          <a:fontRef idx="minor">
+            <a:schemeClr val="tx1"/>
+          </a:fontRef>
+        </p:style>
+      </p:cxnSp>
+      <p:sp>
+        <p:nvSpPr>
+          <p:cNvPr id="237" name="流程圖: 接點 236">
+            <a:extLst>
+              <a:ext uri="{FF2B5EF4-FFF2-40B4-BE49-F238E27FC236}">
+                <a16:creationId xmlns:a16="http://schemas.microsoft.com/office/drawing/2014/main" id="{347E63EA-62F0-4CC5-9F2B-74ED0F9F2F1D}"/>
+              </a:ext>
+            </a:extLst>
+          </p:cNvPr>
+          <p:cNvSpPr/>
+          <p:nvPr/>
+        </p:nvSpPr>
+        <p:spPr>
+          <a:xfrm>
+            <a:off x="5281072" y="3785420"/>
+            <a:ext cx="512358" cy="352816"/>
+          </a:xfrm>
+          <a:prstGeom prst="flowChartConnector">
+            <a:avLst/>
+          </a:prstGeom>
+        </p:spPr>
+        <p:style>
+          <a:lnRef idx="2">
+            <a:schemeClr val="accent4">
+              <a:shade val="50000"/>
+            </a:schemeClr>
+          </a:lnRef>
+          <a:fillRef idx="1">
+            <a:schemeClr val="accent4"/>
+          </a:fillRef>
+          <a:effectRef idx="0">
+            <a:schemeClr val="accent4"/>
+          </a:effectRef>
+          <a:fontRef idx="minor">
+            <a:schemeClr val="lt1"/>
+          </a:fontRef>
+        </p:style>
+        <p:txBody>
+          <a:bodyPr rtlCol="0" anchor="ctr"/>
+          <a:lstStyle/>
+          <a:p>
+            <a:pPr algn="ctr"/>
+            <a:r>
+              <a:rPr lang="en-US" altLang="zh-TW" sz="1400" dirty="0"/>
+              <a:t>SE</a:t>
+            </a:r>
+            <a:endParaRPr lang="zh-TW" altLang="en-US" sz="1400" dirty="0"/>
+          </a:p>
+        </p:txBody>
+      </p:sp>
+      <p:cxnSp>
+        <p:nvCxnSpPr>
+          <p:cNvPr id="238" name="直線單箭頭接點 237">
+            <a:extLst>
+              <a:ext uri="{FF2B5EF4-FFF2-40B4-BE49-F238E27FC236}">
+                <a16:creationId xmlns:a16="http://schemas.microsoft.com/office/drawing/2014/main" id="{B485167B-B263-45F0-8248-09985BB640F8}"/>
+              </a:ext>
+            </a:extLst>
+          </p:cNvPr>
+          <p:cNvCxnSpPr>
+            <a:cxnSpLocks/>
+            <a:stCxn id="159" idx="6"/>
+            <a:endCxn id="237" idx="2"/>
+          </p:cNvCxnSpPr>
+          <p:nvPr/>
+        </p:nvCxnSpPr>
+        <p:spPr>
+          <a:xfrm flipV="1">
+            <a:off x="5101870" y="3961828"/>
+            <a:ext cx="179202" cy="4"/>
+          </a:xfrm>
+          <a:prstGeom prst="straightConnector1">
+            <a:avLst/>
+          </a:prstGeom>
+          <a:ln>
+            <a:tailEnd type="triangle"/>
+          </a:ln>
+        </p:spPr>
+        <p:style>
+          <a:lnRef idx="3">
+            <a:schemeClr val="accent1"/>
+          </a:lnRef>
+          <a:fillRef idx="0">
+            <a:schemeClr val="accent1"/>
+          </a:fillRef>
+          <a:effectRef idx="2">
+            <a:schemeClr val="accent1"/>
+          </a:effectRef>
+          <a:fontRef idx="minor">
+            <a:schemeClr val="tx1"/>
+          </a:fontRef>
+        </p:style>
+      </p:cxnSp>
+      <p:sp>
+        <p:nvSpPr>
+          <p:cNvPr id="239" name="流程圖: 接點 238">
+            <a:extLst>
+              <a:ext uri="{FF2B5EF4-FFF2-40B4-BE49-F238E27FC236}">
+                <a16:creationId xmlns:a16="http://schemas.microsoft.com/office/drawing/2014/main" id="{E6321D38-AE76-4253-AEAB-2D6E8C218B01}"/>
+              </a:ext>
+            </a:extLst>
+          </p:cNvPr>
+          <p:cNvSpPr/>
+          <p:nvPr/>
+        </p:nvSpPr>
+        <p:spPr>
+          <a:xfrm>
+            <a:off x="7311503" y="2980509"/>
+            <a:ext cx="512358" cy="352816"/>
+          </a:xfrm>
+          <a:prstGeom prst="flowChartConnector">
+            <a:avLst/>
+          </a:prstGeom>
+        </p:spPr>
+        <p:style>
+          <a:lnRef idx="2">
+            <a:schemeClr val="accent4">
+              <a:shade val="50000"/>
+            </a:schemeClr>
+          </a:lnRef>
+          <a:fillRef idx="1">
+            <a:schemeClr val="accent4"/>
+          </a:fillRef>
+          <a:effectRef idx="0">
+            <a:schemeClr val="accent4"/>
+          </a:effectRef>
+          <a:fontRef idx="minor">
+            <a:schemeClr val="lt1"/>
+          </a:fontRef>
+        </p:style>
+        <p:txBody>
+          <a:bodyPr rtlCol="0" anchor="ctr"/>
+          <a:lstStyle/>
+          <a:p>
+            <a:pPr algn="ctr"/>
+            <a:r>
+              <a:rPr lang="en-US" altLang="zh-TW" sz="1400" dirty="0"/>
+              <a:t>SE</a:t>
+            </a:r>
+            <a:endParaRPr lang="zh-TW" altLang="en-US" sz="1400" dirty="0"/>
+          </a:p>
+        </p:txBody>
+      </p:sp>
+      <p:cxnSp>
+        <p:nvCxnSpPr>
+          <p:cNvPr id="241" name="直線單箭頭接點 240">
+            <a:extLst>
+              <a:ext uri="{FF2B5EF4-FFF2-40B4-BE49-F238E27FC236}">
+                <a16:creationId xmlns:a16="http://schemas.microsoft.com/office/drawing/2014/main" id="{58BFAA3C-B6FF-476A-99F9-14F121F8DC72}"/>
+              </a:ext>
+            </a:extLst>
+          </p:cNvPr>
+          <p:cNvCxnSpPr>
+            <a:cxnSpLocks/>
+            <a:endCxn id="239" idx="3"/>
+          </p:cNvCxnSpPr>
+          <p:nvPr/>
+        </p:nvCxnSpPr>
+        <p:spPr>
+          <a:xfrm flipV="1">
+            <a:off x="7045463" y="3281656"/>
+            <a:ext cx="341073" cy="1581252"/>
+          </a:xfrm>
+          <a:prstGeom prst="straightConnector1">
+            <a:avLst/>
+          </a:prstGeom>
+          <a:ln>
+            <a:tailEnd type="triangle"/>
+          </a:ln>
+        </p:spPr>
+        <p:style>
+          <a:lnRef idx="3">
+            <a:schemeClr val="accent1"/>
+          </a:lnRef>
+          <a:fillRef idx="0">
+            <a:schemeClr val="accent1"/>
+          </a:fillRef>
+          <a:effectRef idx="2">
+            <a:schemeClr val="accent1"/>
+          </a:effectRef>
+          <a:fontRef idx="minor">
+            <a:schemeClr val="tx1"/>
+          </a:fontRef>
+        </p:style>
+      </p:cxnSp>
+      <p:sp>
+        <p:nvSpPr>
+          <p:cNvPr id="252" name="文字方塊 251">
+            <a:extLst>
+              <a:ext uri="{FF2B5EF4-FFF2-40B4-BE49-F238E27FC236}">
+                <a16:creationId xmlns:a16="http://schemas.microsoft.com/office/drawing/2014/main" id="{C067D8AA-DF8E-4C7A-98D2-10B749B89D8F}"/>
+              </a:ext>
+            </a:extLst>
+          </p:cNvPr>
+          <p:cNvSpPr txBox="1"/>
+          <p:nvPr/>
+        </p:nvSpPr>
+        <p:spPr>
+          <a:xfrm>
+            <a:off x="7371781" y="578099"/>
+            <a:ext cx="382312" cy="276999"/>
+          </a:xfrm>
+          <a:prstGeom prst="rect">
+            <a:avLst/>
+          </a:prstGeom>
+          <a:noFill/>
+        </p:spPr>
+        <p:txBody>
+          <a:bodyPr wrap="square" rtlCol="0">
+            <a:spAutoFit/>
+          </a:bodyPr>
+          <a:lstStyle/>
+          <a:p>
+            <a:r>
+              <a:rPr lang="en-US" altLang="zh-TW" sz="1200" dirty="0">
+                <a:latin typeface="Times New Roman" panose="02020603050405020304" pitchFamily="18" charset="0"/>
+                <a:cs typeface="Times New Roman" panose="02020603050405020304" pitchFamily="18" charset="0"/>
+              </a:rPr>
+              <a:t>lv4</a:t>
+            </a:r>
+            <a:endParaRPr lang="zh-TW" altLang="en-US" sz="1200" dirty="0">
+              <a:latin typeface="Times New Roman" panose="02020603050405020304" pitchFamily="18" charset="0"/>
+              <a:cs typeface="Times New Roman" panose="02020603050405020304" pitchFamily="18" charset="0"/>
+            </a:endParaRPr>
+          </a:p>
+        </p:txBody>
+      </p:sp>
+      <p:sp>
+        <p:nvSpPr>
+          <p:cNvPr id="254" name="文字方塊 253">
+            <a:extLst>
+              <a:ext uri="{FF2B5EF4-FFF2-40B4-BE49-F238E27FC236}">
+                <a16:creationId xmlns:a16="http://schemas.microsoft.com/office/drawing/2014/main" id="{7C2DAB49-816F-48E1-8BB4-31704C664B3A}"/>
+              </a:ext>
+            </a:extLst>
+          </p:cNvPr>
+          <p:cNvSpPr txBox="1"/>
+          <p:nvPr/>
+        </p:nvSpPr>
+        <p:spPr>
+          <a:xfrm>
+            <a:off x="8112864" y="578684"/>
+            <a:ext cx="382312" cy="276999"/>
+          </a:xfrm>
+          <a:prstGeom prst="rect">
+            <a:avLst/>
+          </a:prstGeom>
+          <a:noFill/>
+        </p:spPr>
+        <p:txBody>
+          <a:bodyPr wrap="square" rtlCol="0">
+            <a:spAutoFit/>
+          </a:bodyPr>
+          <a:lstStyle/>
+          <a:p>
+            <a:r>
+              <a:rPr lang="en-US" altLang="zh-TW" sz="1200" dirty="0">
+                <a:latin typeface="Times New Roman" panose="02020603050405020304" pitchFamily="18" charset="0"/>
+                <a:cs typeface="Times New Roman" panose="02020603050405020304" pitchFamily="18" charset="0"/>
+              </a:rPr>
+              <a:t>lv5</a:t>
             </a:r>
             <a:endParaRPr lang="zh-TW" altLang="en-US" sz="1200" dirty="0">
               <a:latin typeface="Times New Roman" panose="02020603050405020304" pitchFamily="18" charset="0"/>

</xml_diff>